<commit_message>
Added to pres, paper and ran some experiments.
Signed-off-by: Saganaught <shihuangdi.qin@gmail.com>
</commit_message>
<xml_diff>
--- a/ZombieOutbreak.pptx
+++ b/ZombieOutbreak.pptx
@@ -375,7 +375,7 @@
     </p:spTree>
     <p:extLst>
       <p:ext uri="{BB962C8B-B14F-4D97-AF65-F5344CB8AC3E}">
-        <p14:creationId xmlns:p14="http://schemas.microsoft.com/office/powerpoint/2010/main" val="1381114562"/>
+        <p14:creationId xmlns:p14="http://schemas.microsoft.com/office/powerpoint/2010/main" xmlns="" val="1381114562"/>
       </p:ext>
     </p:extLst>
   </p:cSld>
@@ -745,11 +745,7 @@
           <a:p>
             <a:r>
               <a:rPr lang="en-US" dirty="0" smtClean="0"/>
-              <a:t>http</a:t>
-            </a:r>
-            <a:r>
-              <a:rPr lang="en-US" dirty="0" smtClean="0"/>
-              <a:t>://www.flickr.com/photos/wonko-the-sane/3442488189/</a:t>
+              <a:t>http://www.flickr.com/photos/wonko-the-sane/3442488189/</a:t>
             </a:r>
             <a:endParaRPr lang="en-US" dirty="0"/>
           </a:p>
@@ -2076,11 +2072,7 @@
           <a:p>
             <a:r>
               <a:rPr lang="en-US" dirty="0" smtClean="0"/>
-              <a:t>http</a:t>
-            </a:r>
-            <a:r>
-              <a:rPr lang="en-US" dirty="0" smtClean="0"/>
-              <a:t>://www.flickr.com/photos/wonko-the-sane/3442488189/</a:t>
+              <a:t>http://www.flickr.com/photos/wonko-the-sane/3442488189/</a:t>
             </a:r>
             <a:endParaRPr lang="en-US" dirty="0"/>
           </a:p>
@@ -5364,16 +5356,7 @@
                 </a:solidFill>
                 <a:latin typeface="Chiller" pitchFamily="82" charset="0"/>
               </a:rPr>
-              <a:t>Experimental </a:t>
-            </a:r>
-            <a:r>
-              <a:rPr lang="en-US" sz="5400" dirty="0" smtClean="0">
-                <a:solidFill>
-                  <a:srgbClr val="FFC000"/>
-                </a:solidFill>
-                <a:latin typeface="Chiller" pitchFamily="82" charset="0"/>
-              </a:rPr>
-              <a:t>Results l</a:t>
+              <a:t>Experimental Results l</a:t>
             </a:r>
             <a:endParaRPr lang="en-US" sz="5400" dirty="0">
               <a:solidFill>
@@ -5447,11 +5430,6 @@
               </a:rPr>
               <a:t>An exponential repulsion force</a:t>
             </a:r>
-            <a:endParaRPr lang="en-US" sz="2000" dirty="0" smtClean="0">
-              <a:solidFill>
-                <a:schemeClr val="accent6"/>
-              </a:solidFill>
-            </a:endParaRPr>
           </a:p>
           <a:p>
             <a:endParaRPr lang="en-US" sz="2400" dirty="0" smtClean="0">
@@ -5474,13 +5452,6 @@
               </a:rPr>
               <a:t>Spirals form when the speed of the zombies and humans are equivalent</a:t>
             </a:r>
-            <a:endParaRPr lang="en-US" sz="2400" dirty="0" smtClean="0">
-              <a:solidFill>
-                <a:schemeClr val="accent6">
-                  <a:lumMod val="75000"/>
-                </a:schemeClr>
-              </a:solidFill>
-            </a:endParaRPr>
           </a:p>
           <a:p>
             <a:pPr algn="just"/>
@@ -5544,10 +5515,10 @@
           <p:nvPr/>
         </p:nvPicPr>
         <p:blipFill>
-          <a:blip r:embed="rId3">
+          <a:blip r:embed="rId3" cstate="print">
             <a:extLst>
               <a:ext uri="{28A0092B-C50C-407E-A947-70E740481C1C}">
-                <a14:useLocalDpi xmlns:a14="http://schemas.microsoft.com/office/drawing/2010/main" val="0"/>
+                <a14:useLocalDpi xmlns:a14="http://schemas.microsoft.com/office/drawing/2010/main" xmlns="" val="0"/>
               </a:ext>
             </a:extLst>
           </a:blip>
@@ -5571,14 +5542,14 @@
           <a:effectLst/>
           <a:extLst>
             <a:ext uri="{909E8E84-426E-40DD-AFC4-6F175D3DCCD1}">
-              <a14:hiddenFill xmlns:a14="http://schemas.microsoft.com/office/drawing/2010/main">
+              <a14:hiddenFill xmlns:a14="http://schemas.microsoft.com/office/drawing/2010/main" xmlns="">
                 <a:solidFill>
                   <a:schemeClr val="accent1"/>
                 </a:solidFill>
               </a14:hiddenFill>
             </a:ext>
             <a:ext uri="{91240B29-F687-4F45-9708-019B960494DF}">
-              <a14:hiddenLine xmlns:a14="http://schemas.microsoft.com/office/drawing/2010/main" w="9525">
+              <a14:hiddenLine xmlns:a14="http://schemas.microsoft.com/office/drawing/2010/main" xmlns="" w="9525">
                 <a:solidFill>
                   <a:schemeClr val="tx1"/>
                 </a:solidFill>
@@ -5588,7 +5559,7 @@
               </a14:hiddenLine>
             </a:ext>
             <a:ext uri="{AF507438-7753-43E0-B8FC-AC1667EBCBE1}">
-              <a14:hiddenEffects xmlns:a14="http://schemas.microsoft.com/office/drawing/2010/main">
+              <a14:hiddenEffects xmlns:a14="http://schemas.microsoft.com/office/drawing/2010/main" xmlns="">
                 <a:effectLst>
                   <a:outerShdw dist="35921" dir="2700000" algn="ctr" rotWithShape="0">
                     <a:schemeClr val="bg2"/>
@@ -5608,10 +5579,10 @@
           <p:nvPr/>
         </p:nvPicPr>
         <p:blipFill>
-          <a:blip r:embed="rId4">
+          <a:blip r:embed="rId4" cstate="print">
             <a:extLst>
               <a:ext uri="{28A0092B-C50C-407E-A947-70E740481C1C}">
-                <a14:useLocalDpi xmlns:a14="http://schemas.microsoft.com/office/drawing/2010/main" val="0"/>
+                <a14:useLocalDpi xmlns:a14="http://schemas.microsoft.com/office/drawing/2010/main" xmlns="" val="0"/>
               </a:ext>
             </a:extLst>
           </a:blip>
@@ -5635,14 +5606,14 @@
           <a:effectLst/>
           <a:extLst>
             <a:ext uri="{909E8E84-426E-40DD-AFC4-6F175D3DCCD1}">
-              <a14:hiddenFill xmlns:a14="http://schemas.microsoft.com/office/drawing/2010/main">
+              <a14:hiddenFill xmlns:a14="http://schemas.microsoft.com/office/drawing/2010/main" xmlns="">
                 <a:solidFill>
                   <a:schemeClr val="accent1"/>
                 </a:solidFill>
               </a14:hiddenFill>
             </a:ext>
             <a:ext uri="{91240B29-F687-4F45-9708-019B960494DF}">
-              <a14:hiddenLine xmlns:a14="http://schemas.microsoft.com/office/drawing/2010/main" w="9525">
+              <a14:hiddenLine xmlns:a14="http://schemas.microsoft.com/office/drawing/2010/main" xmlns="" w="9525">
                 <a:solidFill>
                   <a:schemeClr val="tx1"/>
                 </a:solidFill>
@@ -5652,7 +5623,7 @@
               </a14:hiddenLine>
             </a:ext>
             <a:ext uri="{AF507438-7753-43E0-B8FC-AC1667EBCBE1}">
-              <a14:hiddenEffects xmlns:a14="http://schemas.microsoft.com/office/drawing/2010/main">
+              <a14:hiddenEffects xmlns:a14="http://schemas.microsoft.com/office/drawing/2010/main" xmlns="">
                 <a:effectLst>
                   <a:outerShdw dist="35921" dir="2700000" algn="ctr" rotWithShape="0">
                     <a:schemeClr val="bg2"/>
@@ -5672,10 +5643,10 @@
           <p:nvPr/>
         </p:nvPicPr>
         <p:blipFill>
-          <a:blip r:embed="rId5">
+          <a:blip r:embed="rId5" cstate="print">
             <a:extLst>
               <a:ext uri="{28A0092B-C50C-407E-A947-70E740481C1C}">
-                <a14:useLocalDpi xmlns:a14="http://schemas.microsoft.com/office/drawing/2010/main" val="0"/>
+                <a14:useLocalDpi xmlns:a14="http://schemas.microsoft.com/office/drawing/2010/main" xmlns="" val="0"/>
               </a:ext>
             </a:extLst>
           </a:blip>
@@ -5699,14 +5670,14 @@
           <a:effectLst/>
           <a:extLst>
             <a:ext uri="{909E8E84-426E-40DD-AFC4-6F175D3DCCD1}">
-              <a14:hiddenFill xmlns:a14="http://schemas.microsoft.com/office/drawing/2010/main">
+              <a14:hiddenFill xmlns:a14="http://schemas.microsoft.com/office/drawing/2010/main" xmlns="">
                 <a:solidFill>
                   <a:schemeClr val="accent1"/>
                 </a:solidFill>
               </a14:hiddenFill>
             </a:ext>
             <a:ext uri="{91240B29-F687-4F45-9708-019B960494DF}">
-              <a14:hiddenLine xmlns:a14="http://schemas.microsoft.com/office/drawing/2010/main" w="9525">
+              <a14:hiddenLine xmlns:a14="http://schemas.microsoft.com/office/drawing/2010/main" xmlns="" w="9525">
                 <a:solidFill>
                   <a:schemeClr val="tx1"/>
                 </a:solidFill>
@@ -5716,7 +5687,7 @@
               </a14:hiddenLine>
             </a:ext>
             <a:ext uri="{AF507438-7753-43E0-B8FC-AC1667EBCBE1}">
-              <a14:hiddenEffects xmlns:a14="http://schemas.microsoft.com/office/drawing/2010/main">
+              <a14:hiddenEffects xmlns:a14="http://schemas.microsoft.com/office/drawing/2010/main" xmlns="">
                 <a:effectLst>
                   <a:outerShdw dist="35921" dir="2700000" algn="ctr" rotWithShape="0">
                     <a:schemeClr val="bg2"/>
@@ -5730,7 +5701,7 @@
     </p:spTree>
     <p:extLst>
       <p:ext uri="{BB962C8B-B14F-4D97-AF65-F5344CB8AC3E}">
-        <p14:creationId xmlns:p14="http://schemas.microsoft.com/office/powerpoint/2010/main" val="2390116749"/>
+        <p14:creationId xmlns:p14="http://schemas.microsoft.com/office/powerpoint/2010/main" xmlns="" val="2390116749"/>
       </p:ext>
     </p:extLst>
   </p:cSld>
@@ -6344,7 +6315,7 @@
     </p:spTree>
     <p:extLst>
       <p:ext uri="{BB962C8B-B14F-4D97-AF65-F5344CB8AC3E}">
-        <p14:creationId xmlns:p14="http://schemas.microsoft.com/office/powerpoint/2010/main" val="1886486236"/>
+        <p14:creationId xmlns:p14="http://schemas.microsoft.com/office/powerpoint/2010/main" xmlns="" val="1886486236"/>
       </p:ext>
     </p:extLst>
   </p:cSld>
@@ -6978,6 +6949,37 @@
             </a:endParaRPr>
           </a:p>
           <a:p>
+            <a:r>
+              <a:rPr lang="en-US" sz="2400" dirty="0" smtClean="0">
+                <a:solidFill>
+                  <a:schemeClr val="accent6">
+                    <a:lumMod val="75000"/>
+                  </a:schemeClr>
+                </a:solidFill>
+              </a:rPr>
+              <a:t>The panic induced in the humans is proportional to the number of zombies present</a:t>
+            </a:r>
+          </a:p>
+          <a:p>
+            <a:endParaRPr lang="en-US" sz="2400" dirty="0" smtClean="0">
+              <a:solidFill>
+                <a:schemeClr val="accent6">
+                  <a:lumMod val="75000"/>
+                </a:schemeClr>
+              </a:solidFill>
+            </a:endParaRPr>
+          </a:p>
+          <a:p>
+            <a:r>
+              <a:rPr lang="en-US" sz="2400" dirty="0" smtClean="0">
+                <a:solidFill>
+                  <a:schemeClr val="accent6">
+                    <a:lumMod val="75000"/>
+                  </a:schemeClr>
+                </a:solidFill>
+              </a:rPr>
+              <a:t>Often this can completely destroy the human flocks</a:t>
+            </a:r>
             <a:endParaRPr lang="en-US" sz="2400" dirty="0" smtClean="0">
               <a:solidFill>
                 <a:schemeClr val="accent6">
@@ -7491,7 +7493,7 @@
     </p:spTree>
     <p:extLst>
       <p:ext uri="{BB962C8B-B14F-4D97-AF65-F5344CB8AC3E}">
-        <p14:creationId xmlns:p14="http://schemas.microsoft.com/office/powerpoint/2010/main" val="2339582423"/>
+        <p14:creationId xmlns:p14="http://schemas.microsoft.com/office/powerpoint/2010/main" xmlns="" val="2339582423"/>
       </p:ext>
     </p:extLst>
   </p:cSld>
@@ -8452,7 +8454,7 @@
         <p:spPr>
           <a:xfrm>
             <a:off x="0" y="1225689"/>
-            <a:ext cx="8763000" cy="2862322"/>
+            <a:ext cx="8763000" cy="3785652"/>
           </a:xfrm>
           <a:prstGeom prst="rect">
             <a:avLst/>
@@ -8516,14 +8518,6 @@
           </a:p>
           <a:p>
             <a:pPr lvl="1"/>
-            <a:r>
-              <a:rPr lang="en-US" sz="2000" dirty="0" smtClean="0">
-                <a:solidFill>
-                  <a:schemeClr val="accent6"/>
-                </a:solidFill>
-              </a:rPr>
-              <a:t>Bitten humans may incubate the disease, undetectable by other humans</a:t>
-            </a:r>
             <a:endParaRPr lang="en-US" sz="2000" dirty="0" smtClean="0">
               <a:solidFill>
                 <a:schemeClr val="accent6"/>
@@ -8540,18 +8534,165 @@
           </a:p>
           <a:p>
             <a:pPr lvl="1"/>
+            <a:r>
+              <a:rPr lang="en-US" sz="2000" dirty="0" smtClean="0">
+                <a:solidFill>
+                  <a:schemeClr val="accent6"/>
+                </a:solidFill>
+              </a:rPr>
+              <a:t>Bitten </a:t>
+            </a:r>
+            <a:r>
+              <a:rPr lang="en-US" sz="2000" dirty="0" smtClean="0">
+                <a:solidFill>
+                  <a:schemeClr val="accent6"/>
+                </a:solidFill>
+              </a:rPr>
+              <a:t>humans may incubate the disease, undetectable by other </a:t>
+            </a:r>
+            <a:r>
+              <a:rPr lang="en-US" sz="2000" dirty="0" smtClean="0">
+                <a:solidFill>
+                  <a:schemeClr val="accent6"/>
+                </a:solidFill>
+              </a:rPr>
+              <a:t>humans</a:t>
+            </a:r>
+          </a:p>
+          <a:p>
+            <a:pPr lvl="1"/>
+            <a:r>
+              <a:rPr lang="en-US" sz="2000" dirty="0" smtClean="0">
+                <a:solidFill>
+                  <a:schemeClr val="accent6"/>
+                </a:solidFill>
+              </a:rPr>
+              <a:t>They are displayed in darker shades of green</a:t>
+            </a:r>
             <a:endParaRPr lang="en-US" sz="2000" dirty="0" smtClean="0">
               <a:solidFill>
                 <a:schemeClr val="accent6"/>
               </a:solidFill>
             </a:endParaRPr>
           </a:p>
-        </p:txBody>
-      </p:sp>
+          <a:p>
+            <a:pPr lvl="1"/>
+            <a:endParaRPr lang="en-US" sz="2000" dirty="0" smtClean="0">
+              <a:solidFill>
+                <a:schemeClr val="accent6"/>
+              </a:solidFill>
+            </a:endParaRPr>
+          </a:p>
+          <a:p>
+            <a:pPr lvl="1"/>
+            <a:endParaRPr lang="en-US" sz="2000" dirty="0" smtClean="0">
+              <a:solidFill>
+                <a:schemeClr val="accent6"/>
+              </a:solidFill>
+            </a:endParaRPr>
+          </a:p>
+        </p:txBody>
+      </p:sp>
+      <p:pic>
+        <p:nvPicPr>
+          <p:cNvPr id="1026" name="Picture 2"/>
+          <p:cNvPicPr>
+            <a:picLocks noChangeAspect="1" noChangeArrowheads="1"/>
+          </p:cNvPicPr>
+          <p:nvPr/>
+        </p:nvPicPr>
+        <p:blipFill>
+          <a:blip r:embed="rId3" cstate="print"/>
+          <a:srcRect/>
+          <a:stretch>
+            <a:fillRect/>
+          </a:stretch>
+        </p:blipFill>
+        <p:spPr bwMode="auto">
+          <a:xfrm rot="17184849">
+            <a:off x="1109248" y="1632485"/>
+            <a:ext cx="751399" cy="1127099"/>
+          </a:xfrm>
+          <a:prstGeom prst="rect">
+            <a:avLst/>
+          </a:prstGeom>
+          <a:noFill/>
+          <a:ln w="9525">
+            <a:noFill/>
+            <a:miter lim="800000"/>
+            <a:headEnd/>
+            <a:tailEnd/>
+          </a:ln>
+        </p:spPr>
+      </p:pic>
+      <p:pic>
+        <p:nvPicPr>
+          <p:cNvPr id="1027" name="Picture 3"/>
+          <p:cNvPicPr>
+            <a:picLocks noChangeAspect="1" noChangeArrowheads="1"/>
+          </p:cNvPicPr>
+          <p:nvPr/>
+        </p:nvPicPr>
+        <p:blipFill>
+          <a:blip r:embed="rId4" cstate="print"/>
+          <a:srcRect/>
+          <a:stretch>
+            <a:fillRect/>
+          </a:stretch>
+        </p:blipFill>
+        <p:spPr bwMode="auto">
+          <a:xfrm>
+            <a:off x="4114800" y="1752600"/>
+            <a:ext cx="1451919" cy="1143000"/>
+          </a:xfrm>
+          <a:prstGeom prst="rect">
+            <a:avLst/>
+          </a:prstGeom>
+          <a:noFill/>
+          <a:ln w="9525">
+            <a:noFill/>
+            <a:miter lim="800000"/>
+            <a:headEnd/>
+            <a:tailEnd/>
+          </a:ln>
+        </p:spPr>
+      </p:pic>
+      <p:pic>
+        <p:nvPicPr>
+          <p:cNvPr id="1028" name="Picture 4"/>
+          <p:cNvPicPr>
+            <a:picLocks noChangeAspect="1" noChangeArrowheads="1"/>
+          </p:cNvPicPr>
+          <p:nvPr/>
+        </p:nvPicPr>
+        <p:blipFill>
+          <a:blip r:embed="rId5" cstate="print"/>
+          <a:srcRect/>
+          <a:stretch>
+            <a:fillRect/>
+          </a:stretch>
+        </p:blipFill>
+        <p:spPr bwMode="auto">
+          <a:xfrm>
+            <a:off x="838200" y="4419600"/>
+            <a:ext cx="1620108" cy="1524000"/>
+          </a:xfrm>
+          <a:prstGeom prst="rect">
+            <a:avLst/>
+          </a:prstGeom>
+          <a:noFill/>
+          <a:ln w="9525">
+            <a:noFill/>
+            <a:miter lim="800000"/>
+            <a:headEnd/>
+            <a:tailEnd/>
+          </a:ln>
+        </p:spPr>
+      </p:pic>
     </p:spTree>
     <p:extLst>
       <p:ext uri="{BB962C8B-B14F-4D97-AF65-F5344CB8AC3E}">
-        <p14:creationId xmlns:p14="http://schemas.microsoft.com/office/powerpoint/2010/main" val="3421679227"/>
+        <p14:creationId xmlns:p14="http://schemas.microsoft.com/office/powerpoint/2010/main" xmlns="" val="3421679227"/>
       </p:ext>
     </p:extLst>
   </p:cSld>
@@ -8790,17 +8931,7 @@
                 <a:latin typeface="Chiller" pitchFamily="82" charset="0"/>
                 <a:cs typeface="Andalus" pitchFamily="18" charset="-78"/>
               </a:rPr>
-              <a:t>Agent Behavior </a:t>
-            </a:r>
-            <a:r>
-              <a:rPr lang="en-US" sz="4500" dirty="0" smtClean="0">
-                <a:solidFill>
-                  <a:srgbClr val="FFC000"/>
-                </a:solidFill>
-                <a:latin typeface="Chiller" pitchFamily="82" charset="0"/>
-                <a:cs typeface="Andalus" pitchFamily="18" charset="-78"/>
-              </a:rPr>
-              <a:t>– </a:t>
+              <a:t>Agent Behavior – </a:t>
             </a:r>
             <a:r>
               <a:rPr lang="en-US" sz="4500" dirty="0" smtClean="0">
@@ -8910,10 +9041,10 @@
           <p:nvPr/>
         </p:nvPicPr>
         <p:blipFill>
-          <a:blip r:embed="rId3">
+          <a:blip r:embed="rId3" cstate="print">
             <a:extLst>
               <a:ext uri="{28A0092B-C50C-407E-A947-70E740481C1C}">
-                <a14:useLocalDpi xmlns:a14="http://schemas.microsoft.com/office/drawing/2010/main" val="0"/>
+                <a14:useLocalDpi xmlns:a14="http://schemas.microsoft.com/office/drawing/2010/main" xmlns="" val="0"/>
               </a:ext>
             </a:extLst>
           </a:blip>
@@ -8937,14 +9068,14 @@
           <a:effectLst/>
           <a:extLst>
             <a:ext uri="{909E8E84-426E-40DD-AFC4-6F175D3DCCD1}">
-              <a14:hiddenFill xmlns:a14="http://schemas.microsoft.com/office/drawing/2010/main">
+              <a14:hiddenFill xmlns:a14="http://schemas.microsoft.com/office/drawing/2010/main" xmlns="">
                 <a:solidFill>
                   <a:schemeClr val="accent1"/>
                 </a:solidFill>
               </a14:hiddenFill>
             </a:ext>
             <a:ext uri="{91240B29-F687-4F45-9708-019B960494DF}">
-              <a14:hiddenLine xmlns:a14="http://schemas.microsoft.com/office/drawing/2010/main" w="9525">
+              <a14:hiddenLine xmlns:a14="http://schemas.microsoft.com/office/drawing/2010/main" xmlns="" w="9525">
                 <a:solidFill>
                   <a:schemeClr val="tx1"/>
                 </a:solidFill>
@@ -8954,7 +9085,7 @@
               </a14:hiddenLine>
             </a:ext>
             <a:ext uri="{AF507438-7753-43E0-B8FC-AC1667EBCBE1}">
-              <a14:hiddenEffects xmlns:a14="http://schemas.microsoft.com/office/drawing/2010/main">
+              <a14:hiddenEffects xmlns:a14="http://schemas.microsoft.com/office/drawing/2010/main" xmlns="">
                 <a:effectLst>
                   <a:outerShdw dist="35921" dir="2700000" algn="ctr" rotWithShape="0">
                     <a:schemeClr val="bg2"/>
@@ -8974,10 +9105,10 @@
           <p:nvPr/>
         </p:nvPicPr>
         <p:blipFill>
-          <a:blip r:embed="rId4">
+          <a:blip r:embed="rId4" cstate="print">
             <a:extLst>
               <a:ext uri="{28A0092B-C50C-407E-A947-70E740481C1C}">
-                <a14:useLocalDpi xmlns:a14="http://schemas.microsoft.com/office/drawing/2010/main" val="0"/>
+                <a14:useLocalDpi xmlns:a14="http://schemas.microsoft.com/office/drawing/2010/main" xmlns="" val="0"/>
               </a:ext>
             </a:extLst>
           </a:blip>
@@ -9001,14 +9132,14 @@
           <a:effectLst/>
           <a:extLst>
             <a:ext uri="{909E8E84-426E-40DD-AFC4-6F175D3DCCD1}">
-              <a14:hiddenFill xmlns:a14="http://schemas.microsoft.com/office/drawing/2010/main">
+              <a14:hiddenFill xmlns:a14="http://schemas.microsoft.com/office/drawing/2010/main" xmlns="">
                 <a:solidFill>
                   <a:schemeClr val="accent1"/>
                 </a:solidFill>
               </a14:hiddenFill>
             </a:ext>
             <a:ext uri="{91240B29-F687-4F45-9708-019B960494DF}">
-              <a14:hiddenLine xmlns:a14="http://schemas.microsoft.com/office/drawing/2010/main" w="9525">
+              <a14:hiddenLine xmlns:a14="http://schemas.microsoft.com/office/drawing/2010/main" xmlns="" w="9525">
                 <a:solidFill>
                   <a:schemeClr val="tx1"/>
                 </a:solidFill>
@@ -9018,7 +9149,7 @@
               </a14:hiddenLine>
             </a:ext>
             <a:ext uri="{AF507438-7753-43E0-B8FC-AC1667EBCBE1}">
-              <a14:hiddenEffects xmlns:a14="http://schemas.microsoft.com/office/drawing/2010/main">
+              <a14:hiddenEffects xmlns:a14="http://schemas.microsoft.com/office/drawing/2010/main" xmlns="">
                 <a:effectLst>
                   <a:outerShdw dist="35921" dir="2700000" algn="ctr" rotWithShape="0">
                     <a:schemeClr val="bg2"/>
@@ -9071,10 +9202,10 @@
           <p:nvPr/>
         </p:nvPicPr>
         <p:blipFill rotWithShape="1">
-          <a:blip r:embed="rId5">
+          <a:blip r:embed="rId5" cstate="print">
             <a:extLst>
               <a:ext uri="{28A0092B-C50C-407E-A947-70E740481C1C}">
-                <a14:useLocalDpi xmlns:a14="http://schemas.microsoft.com/office/drawing/2010/main" val="0"/>
+                <a14:useLocalDpi xmlns:a14="http://schemas.microsoft.com/office/drawing/2010/main" xmlns="" val="0"/>
               </a:ext>
             </a:extLst>
           </a:blip>
@@ -9096,14 +9227,14 @@
           <a:effectLst/>
           <a:extLst>
             <a:ext uri="{909E8E84-426E-40DD-AFC4-6F175D3DCCD1}">
-              <a14:hiddenFill xmlns:a14="http://schemas.microsoft.com/office/drawing/2010/main">
+              <a14:hiddenFill xmlns:a14="http://schemas.microsoft.com/office/drawing/2010/main" xmlns="">
                 <a:solidFill>
                   <a:schemeClr val="accent1"/>
                 </a:solidFill>
               </a14:hiddenFill>
             </a:ext>
             <a:ext uri="{91240B29-F687-4F45-9708-019B960494DF}">
-              <a14:hiddenLine xmlns:a14="http://schemas.microsoft.com/office/drawing/2010/main" w="9525">
+              <a14:hiddenLine xmlns:a14="http://schemas.microsoft.com/office/drawing/2010/main" xmlns="" w="9525">
                 <a:solidFill>
                   <a:schemeClr val="tx1"/>
                 </a:solidFill>
@@ -9113,7 +9244,7 @@
               </a14:hiddenLine>
             </a:ext>
             <a:ext uri="{AF507438-7753-43E0-B8FC-AC1667EBCBE1}">
-              <a14:hiddenEffects xmlns:a14="http://schemas.microsoft.com/office/drawing/2010/main">
+              <a14:hiddenEffects xmlns:a14="http://schemas.microsoft.com/office/drawing/2010/main" xmlns="">
                 <a:effectLst>
                   <a:outerShdw dist="35921" dir="2700000" algn="ctr" rotWithShape="0">
                     <a:schemeClr val="bg2"/>
@@ -9173,7 +9304,7 @@
     </p:spTree>
     <p:extLst>
       <p:ext uri="{BB962C8B-B14F-4D97-AF65-F5344CB8AC3E}">
-        <p14:creationId xmlns:p14="http://schemas.microsoft.com/office/powerpoint/2010/main" val="2286665305"/>
+        <p14:creationId xmlns:p14="http://schemas.microsoft.com/office/powerpoint/2010/main" xmlns="" val="2286665305"/>
       </p:ext>
     </p:extLst>
   </p:cSld>
@@ -9756,7 +9887,7 @@
     </p:spTree>
     <p:extLst>
       <p:ext uri="{BB962C8B-B14F-4D97-AF65-F5344CB8AC3E}">
-        <p14:creationId xmlns:p14="http://schemas.microsoft.com/office/powerpoint/2010/main" val="1065909379"/>
+        <p14:creationId xmlns:p14="http://schemas.microsoft.com/office/powerpoint/2010/main" xmlns="" val="1065909379"/>
       </p:ext>
     </p:extLst>
   </p:cSld>

</xml_diff>